<commit_message>
#310 Drafted Incident handling for organizations
</commit_message>
<xml_diff>
--- a/Articles/310/images/Errors as data.pptx
+++ b/Articles/310/images/Errors as data.pptx
@@ -5,18 +5,19 @@
     <p:sldMasterId id="2147483684" r:id="rId4"/>
   </p:sldMasterIdLst>
   <p:notesMasterIdLst>
-    <p:notesMasterId r:id="rId11"/>
+    <p:notesMasterId r:id="rId12"/>
   </p:notesMasterIdLst>
   <p:handoutMasterIdLst>
-    <p:handoutMasterId r:id="rId12"/>
+    <p:handoutMasterId r:id="rId13"/>
   </p:handoutMasterIdLst>
   <p:sldIdLst>
     <p:sldId id="256" r:id="rId5"/>
     <p:sldId id="257" r:id="rId6"/>
-    <p:sldId id="259" r:id="rId7"/>
-    <p:sldId id="260" r:id="rId8"/>
-    <p:sldId id="258" r:id="rId9"/>
-    <p:sldId id="261" r:id="rId10"/>
+    <p:sldId id="262" r:id="rId7"/>
+    <p:sldId id="259" r:id="rId8"/>
+    <p:sldId id="260" r:id="rId9"/>
+    <p:sldId id="258" r:id="rId10"/>
+    <p:sldId id="261" r:id="rId11"/>
   </p:sldIdLst>
   <p:sldSz cx="12192000" cy="6858000"/>
   <p:notesSz cx="6858000" cy="9144000"/>
@@ -252,7 +253,7 @@
             <a:fld id="{B1603AB5-52B7-8045-BEFE-97F8347DAEAC}" type="datetimeFigureOut">
               <a:rPr lang="en-US" smtClean="0"/>
               <a:pPr/>
-              <a:t>2/19/2021</a:t>
+              <a:t>2/22/2021</a:t>
             </a:fld>
             <a:endParaRPr lang="en-US"/>
           </a:p>
@@ -420,7 +421,7 @@
             <a:fld id="{EFF03303-0379-0E48-9B93-EC7286F8FEE5}" type="datetimeFigureOut">
               <a:rPr lang="en-US" smtClean="0"/>
               <a:pPr/>
-              <a:t>2/19/2021</a:t>
+              <a:t>2/22/2021</a:t>
             </a:fld>
             <a:endParaRPr lang="en-US"/>
           </a:p>
@@ -4793,78 +4794,10 @@
       </p:grpSpPr>
       <p:sp>
         <p:nvSpPr>
-          <p:cNvPr id="3" name="Content Placeholder 2">
+          <p:cNvPr id="2" name="Title 1">
             <a:extLst>
               <a:ext uri="{FF2B5EF4-FFF2-40B4-BE49-F238E27FC236}">
-                <a16:creationId xmlns:a16="http://schemas.microsoft.com/office/drawing/2014/main" id="{B885BDF4-10A7-4283-809F-765392BFCE47}"/>
-              </a:ext>
-            </a:extLst>
-          </p:cNvPr>
-          <p:cNvSpPr>
-            <a:spLocks noGrp="1"/>
-          </p:cNvSpPr>
-          <p:nvPr>
-            <p:ph idx="1"/>
-          </p:nvPr>
-        </p:nvSpPr>
-        <p:spPr>
-          <a:xfrm>
-            <a:off x="939289" y="4143410"/>
-            <a:ext cx="10729384" cy="2256072"/>
-          </a:xfrm>
-        </p:spPr>
-        <p:txBody>
-          <a:bodyPr/>
-          <a:lstStyle/>
-          <a:p>
-            <a:r>
-              <a:rPr lang="en-US" dirty="0"/>
-              <a:t>Cannot read from database (connection error, database procedure change, … )</a:t>
-            </a:r>
-          </a:p>
-          <a:p>
-            <a:r>
-              <a:rPr lang="en-US" dirty="0"/>
-              <a:t>Encountered division by zero (application builder needs to dive in the code)</a:t>
-            </a:r>
-          </a:p>
-          <a:p>
-            <a:r>
-              <a:rPr lang="en-US" dirty="0"/>
-              <a:t>It seems to take a lot longer (need to check the math </a:t>
-            </a:r>
-            <a:r>
-              <a:rPr lang="en-US" dirty="0" err="1"/>
-              <a:t>progr</a:t>
-            </a:r>
-            <a:r>
-              <a:rPr lang="en-US" dirty="0"/>
-              <a:t> design, slow connections, …)</a:t>
-            </a:r>
-          </a:p>
-          <a:p>
-            <a:endParaRPr lang="en-US" dirty="0"/>
-          </a:p>
-          <a:p>
-            <a:r>
-              <a:rPr lang="en-US" dirty="0"/>
-              <a:t>Note: both data session and solver sessions.</a:t>
-            </a:r>
-          </a:p>
-          <a:p>
-            <a:endParaRPr lang="en-US" dirty="0"/>
-          </a:p>
-          <a:p>
-            <a:endParaRPr lang="en-US" dirty="0"/>
-          </a:p>
-        </p:txBody>
-      </p:sp>
-      <p:sp>
-        <p:nvSpPr>
-          <p:cNvPr id="2" name="Title 1">
-            <a:extLst>
-              <a:ext uri="{FF2B5EF4-FFF2-40B4-BE49-F238E27FC236}">
-                <a16:creationId xmlns:a16="http://schemas.microsoft.com/office/drawing/2014/main" id="{0197F513-F5E0-458D-AA34-8D8DD8FAE328}"/>
+                <a16:creationId xmlns:a16="http://schemas.microsoft.com/office/drawing/2014/main" id="{DFBB7AD4-ECBE-419A-814D-8789320E81B4}"/>
               </a:ext>
             </a:extLst>
           </p:cNvPr>
@@ -4880,10 +4813,32 @@
           <a:bodyPr/>
           <a:lstStyle/>
           <a:p>
-            <a:r>
-              <a:rPr lang="en-US" dirty="0"/>
-              <a:t>Errors during end-user use</a:t>
-            </a:r>
+            <a:endParaRPr lang="en-US"/>
+          </a:p>
+        </p:txBody>
+      </p:sp>
+      <p:sp>
+        <p:nvSpPr>
+          <p:cNvPr id="3" name="Content Placeholder 2">
+            <a:extLst>
+              <a:ext uri="{FF2B5EF4-FFF2-40B4-BE49-F238E27FC236}">
+                <a16:creationId xmlns:a16="http://schemas.microsoft.com/office/drawing/2014/main" id="{48DEF6FF-7788-4B78-BEA2-BE0B7E70431D}"/>
+              </a:ext>
+            </a:extLst>
+          </p:cNvPr>
+          <p:cNvSpPr>
+            <a:spLocks noGrp="1"/>
+          </p:cNvSpPr>
+          <p:nvPr>
+            <p:ph idx="1"/>
+          </p:nvPr>
+        </p:nvSpPr>
+        <p:spPr/>
+        <p:txBody>
+          <a:bodyPr/>
+          <a:lstStyle/>
+          <a:p>
+            <a:endParaRPr lang="en-US" dirty="0"/>
           </a:p>
         </p:txBody>
       </p:sp>
@@ -4892,7 +4847,7 @@
           <p:cNvPr id="4" name="Slide Number Placeholder 3">
             <a:extLst>
               <a:ext uri="{FF2B5EF4-FFF2-40B4-BE49-F238E27FC236}">
-                <a16:creationId xmlns:a16="http://schemas.microsoft.com/office/drawing/2014/main" id="{37629900-8772-42B9-852D-C901071740CB}"/>
+                <a16:creationId xmlns:a16="http://schemas.microsoft.com/office/drawing/2014/main" id="{B1D324DA-8E3E-444D-9F87-CC948F66DF90}"/>
               </a:ext>
             </a:extLst>
           </p:cNvPr>
@@ -4912,6 +4867,1232 @@
               <a:rPr lang="en-US" smtClean="0"/>
               <a:pPr/>
               <a:t>3</a:t>
+            </a:fld>
+            <a:endParaRPr lang="en-US" dirty="0"/>
+          </a:p>
+        </p:txBody>
+      </p:sp>
+      <p:pic>
+        <p:nvPicPr>
+          <p:cNvPr id="5" name="Content Placeholder 25" descr="Woman with solid fill">
+            <a:extLst>
+              <a:ext uri="{FF2B5EF4-FFF2-40B4-BE49-F238E27FC236}">
+                <a16:creationId xmlns:a16="http://schemas.microsoft.com/office/drawing/2014/main" id="{A70443E6-A1FB-4B6B-99E2-029DC8A5C7A5}"/>
+              </a:ext>
+            </a:extLst>
+          </p:cNvPr>
+          <p:cNvPicPr>
+            <a:picLocks noChangeAspect="1"/>
+          </p:cNvPicPr>
+          <p:nvPr/>
+        </p:nvPicPr>
+        <p:blipFill>
+          <a:blip r:embed="rId2">
+            <a:extLst>
+              <a:ext uri="{96DAC541-7B7A-43D3-8B79-37D633B846F1}">
+                <asvg:svgBlip xmlns:asvg="http://schemas.microsoft.com/office/drawing/2016/SVG/main" r:embed="rId3"/>
+              </a:ext>
+            </a:extLst>
+          </a:blip>
+          <a:stretch>
+            <a:fillRect/>
+          </a:stretch>
+        </p:blipFill>
+        <p:spPr>
+          <a:xfrm>
+            <a:off x="1463941" y="2693034"/>
+            <a:ext cx="914400" cy="914400"/>
+          </a:xfrm>
+          <a:prstGeom prst="rect">
+            <a:avLst/>
+          </a:prstGeom>
+        </p:spPr>
+      </p:pic>
+      <p:pic>
+        <p:nvPicPr>
+          <p:cNvPr id="6" name="Graphic 5" descr="Monitor with solid fill">
+            <a:extLst>
+              <a:ext uri="{FF2B5EF4-FFF2-40B4-BE49-F238E27FC236}">
+                <a16:creationId xmlns:a16="http://schemas.microsoft.com/office/drawing/2014/main" id="{B541DF46-12BA-4B83-9739-6221DBE6A524}"/>
+              </a:ext>
+            </a:extLst>
+          </p:cNvPr>
+          <p:cNvPicPr>
+            <a:picLocks noChangeAspect="1"/>
+          </p:cNvPicPr>
+          <p:nvPr/>
+        </p:nvPicPr>
+        <p:blipFill>
+          <a:blip r:embed="rId4">
+            <a:extLst>
+              <a:ext uri="{96DAC541-7B7A-43D3-8B79-37D633B846F1}">
+                <asvg:svgBlip xmlns:asvg="http://schemas.microsoft.com/office/drawing/2016/SVG/main" r:embed="rId5"/>
+              </a:ext>
+            </a:extLst>
+          </a:blip>
+          <a:stretch>
+            <a:fillRect/>
+          </a:stretch>
+        </p:blipFill>
+        <p:spPr>
+          <a:xfrm>
+            <a:off x="2199947" y="2336145"/>
+            <a:ext cx="914400" cy="914400"/>
+          </a:xfrm>
+          <a:prstGeom prst="rect">
+            <a:avLst/>
+          </a:prstGeom>
+        </p:spPr>
+      </p:pic>
+      <p:pic>
+        <p:nvPicPr>
+          <p:cNvPr id="7" name="Graphic 6" descr="Keyboard outline">
+            <a:extLst>
+              <a:ext uri="{FF2B5EF4-FFF2-40B4-BE49-F238E27FC236}">
+                <a16:creationId xmlns:a16="http://schemas.microsoft.com/office/drawing/2014/main" id="{FE07F8B9-993E-487F-85AE-DC8A33796797}"/>
+              </a:ext>
+            </a:extLst>
+          </p:cNvPr>
+          <p:cNvPicPr>
+            <a:picLocks noChangeAspect="1"/>
+          </p:cNvPicPr>
+          <p:nvPr/>
+        </p:nvPicPr>
+        <p:blipFill>
+          <a:blip r:embed="rId6">
+            <a:extLst>
+              <a:ext uri="{96DAC541-7B7A-43D3-8B79-37D633B846F1}">
+                <asvg:svgBlip xmlns:asvg="http://schemas.microsoft.com/office/drawing/2016/SVG/main" r:embed="rId7"/>
+              </a:ext>
+            </a:extLst>
+          </a:blip>
+          <a:stretch>
+            <a:fillRect/>
+          </a:stretch>
+        </p:blipFill>
+        <p:spPr>
+          <a:xfrm>
+            <a:off x="2199947" y="2904528"/>
+            <a:ext cx="914400" cy="914400"/>
+          </a:xfrm>
+          <a:prstGeom prst="rect">
+            <a:avLst/>
+          </a:prstGeom>
+        </p:spPr>
+      </p:pic>
+      <p:sp>
+        <p:nvSpPr>
+          <p:cNvPr id="8" name="TextBox 7">
+            <a:extLst>
+              <a:ext uri="{FF2B5EF4-FFF2-40B4-BE49-F238E27FC236}">
+                <a16:creationId xmlns:a16="http://schemas.microsoft.com/office/drawing/2014/main" id="{050430E0-C529-4797-B513-31B8A1EBE311}"/>
+              </a:ext>
+            </a:extLst>
+          </p:cNvPr>
+          <p:cNvSpPr txBox="1"/>
+          <p:nvPr/>
+        </p:nvSpPr>
+        <p:spPr>
+          <a:xfrm>
+            <a:off x="8922588" y="3641719"/>
+            <a:ext cx="1134932" cy="451821"/>
+          </a:xfrm>
+          <a:prstGeom prst="rect">
+            <a:avLst/>
+          </a:prstGeom>
+        </p:spPr>
+        <p:txBody>
+          <a:bodyPr vert="horz" wrap="square" lIns="91440" tIns="45720" rIns="91440" bIns="45720" rtlCol="0" anchor="t">
+            <a:noAutofit/>
+          </a:bodyPr>
+          <a:lstStyle/>
+          <a:p>
+            <a:r>
+              <a:rPr lang="en-US" sz="1800" cap="none" baseline="0" dirty="0"/>
+              <a:t>End user</a:t>
+            </a:r>
+          </a:p>
+        </p:txBody>
+      </p:sp>
+      <p:pic>
+        <p:nvPicPr>
+          <p:cNvPr id="9" name="Graphic 8" descr="Users with solid fill">
+            <a:extLst>
+              <a:ext uri="{FF2B5EF4-FFF2-40B4-BE49-F238E27FC236}">
+                <a16:creationId xmlns:a16="http://schemas.microsoft.com/office/drawing/2014/main" id="{E951F9C8-906A-498D-A1FB-1543525C2D1E}"/>
+              </a:ext>
+            </a:extLst>
+          </p:cNvPr>
+          <p:cNvPicPr>
+            <a:picLocks noChangeAspect="1"/>
+          </p:cNvPicPr>
+          <p:nvPr/>
+        </p:nvPicPr>
+        <p:blipFill>
+          <a:blip r:embed="rId8">
+            <a:extLst>
+              <a:ext uri="{96DAC541-7B7A-43D3-8B79-37D633B846F1}">
+                <asvg:svgBlip xmlns:asvg="http://schemas.microsoft.com/office/drawing/2016/SVG/main" r:embed="rId9"/>
+              </a:ext>
+            </a:extLst>
+          </a:blip>
+          <a:stretch>
+            <a:fillRect/>
+          </a:stretch>
+        </p:blipFill>
+        <p:spPr>
+          <a:xfrm>
+            <a:off x="5616275" y="2466155"/>
+            <a:ext cx="914400" cy="914400"/>
+          </a:xfrm>
+          <a:prstGeom prst="rect">
+            <a:avLst/>
+          </a:prstGeom>
+        </p:spPr>
+      </p:pic>
+      <p:sp>
+        <p:nvSpPr>
+          <p:cNvPr id="10" name="TextBox 9">
+            <a:extLst>
+              <a:ext uri="{FF2B5EF4-FFF2-40B4-BE49-F238E27FC236}">
+                <a16:creationId xmlns:a16="http://schemas.microsoft.com/office/drawing/2014/main" id="{F53C09D4-525F-4B4C-B884-B60B30D5B90C}"/>
+              </a:ext>
+            </a:extLst>
+          </p:cNvPr>
+          <p:cNvSpPr txBox="1"/>
+          <p:nvPr/>
+        </p:nvSpPr>
+        <p:spPr>
+          <a:xfrm>
+            <a:off x="5405057" y="2277303"/>
+            <a:ext cx="1287332" cy="451821"/>
+          </a:xfrm>
+          <a:prstGeom prst="rect">
+            <a:avLst/>
+          </a:prstGeom>
+        </p:spPr>
+        <p:txBody>
+          <a:bodyPr vert="horz" wrap="square" lIns="91440" tIns="45720" rIns="91440" bIns="45720" rtlCol="0" anchor="t">
+            <a:noAutofit/>
+          </a:bodyPr>
+          <a:lstStyle/>
+          <a:p>
+            <a:r>
+              <a:rPr lang="en-US" sz="1800" cap="none" baseline="0" dirty="0"/>
+              <a:t>specialists</a:t>
+            </a:r>
+          </a:p>
+        </p:txBody>
+      </p:sp>
+      <p:sp>
+        <p:nvSpPr>
+          <p:cNvPr id="11" name="Arrow: Right 10">
+            <a:extLst>
+              <a:ext uri="{FF2B5EF4-FFF2-40B4-BE49-F238E27FC236}">
+                <a16:creationId xmlns:a16="http://schemas.microsoft.com/office/drawing/2014/main" id="{CA8D86F4-F343-40DD-8F2D-F120571788E6}"/>
+              </a:ext>
+            </a:extLst>
+          </p:cNvPr>
+          <p:cNvSpPr/>
+          <p:nvPr/>
+        </p:nvSpPr>
+        <p:spPr>
+          <a:xfrm>
+            <a:off x="3214752" y="2492677"/>
+            <a:ext cx="2061879" cy="634103"/>
+          </a:xfrm>
+          <a:prstGeom prst="rightArrow">
+            <a:avLst/>
+          </a:prstGeom>
+        </p:spPr>
+        <p:style>
+          <a:lnRef idx="1">
+            <a:schemeClr val="accent1"/>
+          </a:lnRef>
+          <a:fillRef idx="3">
+            <a:schemeClr val="accent1"/>
+          </a:fillRef>
+          <a:effectRef idx="2">
+            <a:schemeClr val="accent1"/>
+          </a:effectRef>
+          <a:fontRef idx="minor">
+            <a:schemeClr val="lt1"/>
+          </a:fontRef>
+        </p:style>
+        <p:txBody>
+          <a:bodyPr rtlCol="0" anchor="ctr"/>
+          <a:lstStyle/>
+          <a:p>
+            <a:pPr algn="ctr"/>
+            <a:r>
+              <a:rPr lang="en-US" dirty="0"/>
+              <a:t>Session History</a:t>
+            </a:r>
+          </a:p>
+        </p:txBody>
+      </p:sp>
+      <p:sp>
+        <p:nvSpPr>
+          <p:cNvPr id="12" name="Arrow: Left 11">
+            <a:extLst>
+              <a:ext uri="{FF2B5EF4-FFF2-40B4-BE49-F238E27FC236}">
+                <a16:creationId xmlns:a16="http://schemas.microsoft.com/office/drawing/2014/main" id="{A549A088-EAA9-4608-B717-A8A742A6FD56}"/>
+              </a:ext>
+            </a:extLst>
+          </p:cNvPr>
+          <p:cNvSpPr/>
+          <p:nvPr/>
+        </p:nvSpPr>
+        <p:spPr>
+          <a:xfrm>
+            <a:off x="3214752" y="3126780"/>
+            <a:ext cx="2077118" cy="451821"/>
+          </a:xfrm>
+          <a:prstGeom prst="leftArrow">
+            <a:avLst/>
+          </a:prstGeom>
+        </p:spPr>
+        <p:style>
+          <a:lnRef idx="1">
+            <a:schemeClr val="accent1"/>
+          </a:lnRef>
+          <a:fillRef idx="3">
+            <a:schemeClr val="accent1"/>
+          </a:fillRef>
+          <a:effectRef idx="2">
+            <a:schemeClr val="accent1"/>
+          </a:effectRef>
+          <a:fontRef idx="minor">
+            <a:schemeClr val="lt1"/>
+          </a:fontRef>
+        </p:style>
+        <p:txBody>
+          <a:bodyPr rtlCol="0" anchor="ctr"/>
+          <a:lstStyle/>
+          <a:p>
+            <a:pPr algn="ctr"/>
+            <a:r>
+              <a:rPr lang="en-US" dirty="0"/>
+              <a:t>Suggestions</a:t>
+            </a:r>
+          </a:p>
+        </p:txBody>
+      </p:sp>
+      <p:sp>
+        <p:nvSpPr>
+          <p:cNvPr id="13" name="Arrow: Down 12">
+            <a:extLst>
+              <a:ext uri="{FF2B5EF4-FFF2-40B4-BE49-F238E27FC236}">
+                <a16:creationId xmlns:a16="http://schemas.microsoft.com/office/drawing/2014/main" id="{BA8DE349-BF1F-4E70-9D50-E179170E6E64}"/>
+              </a:ext>
+            </a:extLst>
+          </p:cNvPr>
+          <p:cNvSpPr/>
+          <p:nvPr/>
+        </p:nvSpPr>
+        <p:spPr>
+          <a:xfrm>
+            <a:off x="4821233" y="3278211"/>
+            <a:ext cx="2494874" cy="1043495"/>
+          </a:xfrm>
+          <a:prstGeom prst="downArrow">
+            <a:avLst/>
+          </a:prstGeom>
+        </p:spPr>
+        <p:style>
+          <a:lnRef idx="1">
+            <a:schemeClr val="accent1"/>
+          </a:lnRef>
+          <a:fillRef idx="3">
+            <a:schemeClr val="accent1"/>
+          </a:fillRef>
+          <a:effectRef idx="2">
+            <a:schemeClr val="accent1"/>
+          </a:effectRef>
+          <a:fontRef idx="minor">
+            <a:schemeClr val="lt1"/>
+          </a:fontRef>
+        </p:style>
+        <p:txBody>
+          <a:bodyPr rtlCol="0" anchor="ctr"/>
+          <a:lstStyle/>
+          <a:p>
+            <a:pPr algn="ctr"/>
+            <a:r>
+              <a:rPr lang="en-US" dirty="0"/>
+              <a:t>Corrective actions</a:t>
+            </a:r>
+          </a:p>
+        </p:txBody>
+      </p:sp>
+      <p:sp>
+        <p:nvSpPr>
+          <p:cNvPr id="14" name="Arrow: Left 13">
+            <a:extLst>
+              <a:ext uri="{FF2B5EF4-FFF2-40B4-BE49-F238E27FC236}">
+                <a16:creationId xmlns:a16="http://schemas.microsoft.com/office/drawing/2014/main" id="{89EF7AAC-33AF-48F7-BBE0-E4060134C20F}"/>
+              </a:ext>
+            </a:extLst>
+          </p:cNvPr>
+          <p:cNvSpPr/>
+          <p:nvPr/>
+        </p:nvSpPr>
+        <p:spPr>
+          <a:xfrm>
+            <a:off x="6857121" y="2494242"/>
+            <a:ext cx="1975818" cy="654698"/>
+          </a:xfrm>
+          <a:prstGeom prst="leftArrow">
+            <a:avLst/>
+          </a:prstGeom>
+        </p:spPr>
+        <p:style>
+          <a:lnRef idx="1">
+            <a:schemeClr val="accent1"/>
+          </a:lnRef>
+          <a:fillRef idx="3">
+            <a:schemeClr val="accent1"/>
+          </a:fillRef>
+          <a:effectRef idx="2">
+            <a:schemeClr val="accent1"/>
+          </a:effectRef>
+          <a:fontRef idx="minor">
+            <a:schemeClr val="lt1"/>
+          </a:fontRef>
+        </p:style>
+        <p:txBody>
+          <a:bodyPr rtlCol="0" anchor="ctr"/>
+          <a:lstStyle/>
+          <a:p>
+            <a:pPr algn="ctr"/>
+            <a:r>
+              <a:rPr lang="en-US" dirty="0"/>
+              <a:t>Session History</a:t>
+            </a:r>
+          </a:p>
+        </p:txBody>
+      </p:sp>
+      <p:sp>
+        <p:nvSpPr>
+          <p:cNvPr id="15" name="Arrow: Right 14">
+            <a:extLst>
+              <a:ext uri="{FF2B5EF4-FFF2-40B4-BE49-F238E27FC236}">
+                <a16:creationId xmlns:a16="http://schemas.microsoft.com/office/drawing/2014/main" id="{C48BB873-6DCC-4599-A37A-E670F1991D69}"/>
+              </a:ext>
+            </a:extLst>
+          </p:cNvPr>
+          <p:cNvSpPr/>
+          <p:nvPr/>
+        </p:nvSpPr>
+        <p:spPr>
+          <a:xfrm>
+            <a:off x="6888490" y="3103832"/>
+            <a:ext cx="1944449" cy="424393"/>
+          </a:xfrm>
+          <a:prstGeom prst="rightArrow">
+            <a:avLst/>
+          </a:prstGeom>
+        </p:spPr>
+        <p:style>
+          <a:lnRef idx="1">
+            <a:schemeClr val="accent1"/>
+          </a:lnRef>
+          <a:fillRef idx="3">
+            <a:schemeClr val="accent1"/>
+          </a:fillRef>
+          <a:effectRef idx="2">
+            <a:schemeClr val="accent1"/>
+          </a:effectRef>
+          <a:fontRef idx="minor">
+            <a:schemeClr val="lt1"/>
+          </a:fontRef>
+        </p:style>
+        <p:txBody>
+          <a:bodyPr rtlCol="0" anchor="ctr"/>
+          <a:lstStyle/>
+          <a:p>
+            <a:pPr algn="ctr"/>
+            <a:r>
+              <a:rPr lang="en-US" dirty="0"/>
+              <a:t>Suggestions</a:t>
+            </a:r>
+          </a:p>
+        </p:txBody>
+      </p:sp>
+      <p:pic>
+        <p:nvPicPr>
+          <p:cNvPr id="16" name="Graphic 15" descr="Monitor with solid fill">
+            <a:extLst>
+              <a:ext uri="{FF2B5EF4-FFF2-40B4-BE49-F238E27FC236}">
+                <a16:creationId xmlns:a16="http://schemas.microsoft.com/office/drawing/2014/main" id="{5495B972-99D3-4796-AFF8-9FC639AA15C1}"/>
+              </a:ext>
+            </a:extLst>
+          </p:cNvPr>
+          <p:cNvPicPr>
+            <a:picLocks noChangeAspect="1"/>
+          </p:cNvPicPr>
+          <p:nvPr/>
+        </p:nvPicPr>
+        <p:blipFill>
+          <a:blip r:embed="rId4">
+            <a:extLst>
+              <a:ext uri="{96DAC541-7B7A-43D3-8B79-37D633B846F1}">
+                <asvg:svgBlip xmlns:asvg="http://schemas.microsoft.com/office/drawing/2016/SVG/main" r:embed="rId5"/>
+              </a:ext>
+            </a:extLst>
+          </a:blip>
+          <a:stretch>
+            <a:fillRect/>
+          </a:stretch>
+        </p:blipFill>
+        <p:spPr>
+          <a:xfrm>
+            <a:off x="8950856" y="2336145"/>
+            <a:ext cx="914400" cy="914400"/>
+          </a:xfrm>
+          <a:prstGeom prst="rect">
+            <a:avLst/>
+          </a:prstGeom>
+        </p:spPr>
+      </p:pic>
+      <p:pic>
+        <p:nvPicPr>
+          <p:cNvPr id="17" name="Graphic 16" descr="Keyboard outline">
+            <a:extLst>
+              <a:ext uri="{FF2B5EF4-FFF2-40B4-BE49-F238E27FC236}">
+                <a16:creationId xmlns:a16="http://schemas.microsoft.com/office/drawing/2014/main" id="{8411A1C9-7621-479F-9DA0-36BC40EB4682}"/>
+              </a:ext>
+            </a:extLst>
+          </p:cNvPr>
+          <p:cNvPicPr>
+            <a:picLocks noChangeAspect="1"/>
+          </p:cNvPicPr>
+          <p:nvPr/>
+        </p:nvPicPr>
+        <p:blipFill>
+          <a:blip r:embed="rId6">
+            <a:extLst>
+              <a:ext uri="{96DAC541-7B7A-43D3-8B79-37D633B846F1}">
+                <asvg:svgBlip xmlns:asvg="http://schemas.microsoft.com/office/drawing/2016/SVG/main" r:embed="rId7"/>
+              </a:ext>
+            </a:extLst>
+          </a:blip>
+          <a:stretch>
+            <a:fillRect/>
+          </a:stretch>
+        </p:blipFill>
+        <p:spPr>
+          <a:xfrm>
+            <a:off x="8992055" y="2874048"/>
+            <a:ext cx="914400" cy="914400"/>
+          </a:xfrm>
+          <a:prstGeom prst="rect">
+            <a:avLst/>
+          </a:prstGeom>
+        </p:spPr>
+      </p:pic>
+      <p:sp>
+        <p:nvSpPr>
+          <p:cNvPr id="18" name="TextBox 17">
+            <a:extLst>
+              <a:ext uri="{FF2B5EF4-FFF2-40B4-BE49-F238E27FC236}">
+                <a16:creationId xmlns:a16="http://schemas.microsoft.com/office/drawing/2014/main" id="{B117646E-4D97-46EA-9014-22A8088DBCAA}"/>
+              </a:ext>
+            </a:extLst>
+          </p:cNvPr>
+          <p:cNvSpPr txBox="1"/>
+          <p:nvPr/>
+        </p:nvSpPr>
+        <p:spPr>
+          <a:xfrm>
+            <a:off x="2089681" y="3576613"/>
+            <a:ext cx="1134932" cy="451821"/>
+          </a:xfrm>
+          <a:prstGeom prst="rect">
+            <a:avLst/>
+          </a:prstGeom>
+        </p:spPr>
+        <p:txBody>
+          <a:bodyPr vert="horz" wrap="square" lIns="91440" tIns="45720" rIns="91440" bIns="45720" rtlCol="0" anchor="t">
+            <a:noAutofit/>
+          </a:bodyPr>
+          <a:lstStyle/>
+          <a:p>
+            <a:r>
+              <a:rPr lang="en-US" sz="1800" cap="none" baseline="0" dirty="0"/>
+              <a:t>End user</a:t>
+            </a:r>
+          </a:p>
+        </p:txBody>
+      </p:sp>
+      <p:pic>
+        <p:nvPicPr>
+          <p:cNvPr id="19" name="Graphic 18" descr="Man with solid fill">
+            <a:extLst>
+              <a:ext uri="{FF2B5EF4-FFF2-40B4-BE49-F238E27FC236}">
+                <a16:creationId xmlns:a16="http://schemas.microsoft.com/office/drawing/2014/main" id="{CFB1C0DE-DA84-4BF4-854D-DF8FB9F324B6}"/>
+              </a:ext>
+            </a:extLst>
+          </p:cNvPr>
+          <p:cNvPicPr>
+            <a:picLocks noChangeAspect="1"/>
+          </p:cNvPicPr>
+          <p:nvPr/>
+        </p:nvPicPr>
+        <p:blipFill>
+          <a:blip r:embed="rId10">
+            <a:extLst>
+              <a:ext uri="{96DAC541-7B7A-43D3-8B79-37D633B846F1}">
+                <asvg:svgBlip xmlns:asvg="http://schemas.microsoft.com/office/drawing/2016/SVG/main" r:embed="rId11"/>
+              </a:ext>
+            </a:extLst>
+          </a:blip>
+          <a:stretch>
+            <a:fillRect/>
+          </a:stretch>
+        </p:blipFill>
+        <p:spPr>
+          <a:xfrm>
+            <a:off x="9698021" y="2569394"/>
+            <a:ext cx="914400" cy="914400"/>
+          </a:xfrm>
+          <a:prstGeom prst="rect">
+            <a:avLst/>
+          </a:prstGeom>
+        </p:spPr>
+      </p:pic>
+    </p:spTree>
+    <p:extLst>
+      <p:ext uri="{BB962C8B-B14F-4D97-AF65-F5344CB8AC3E}">
+        <p14:creationId xmlns:p14="http://schemas.microsoft.com/office/powerpoint/2010/main" val="4108302506"/>
+      </p:ext>
+    </p:extLst>
+  </p:cSld>
+  <p:clrMapOvr>
+    <a:masterClrMapping/>
+  </p:clrMapOvr>
+  <p:timing>
+    <p:tnLst>
+      <p:par>
+        <p:cTn id="1" dur="indefinite" restart="never" nodeType="tmRoot">
+          <p:childTnLst>
+            <p:seq concurrent="1" nextAc="seek">
+              <p:cTn id="2" dur="indefinite" nodeType="mainSeq">
+                <p:childTnLst>
+                  <p:par>
+                    <p:cTn id="3" fill="hold">
+                      <p:stCondLst>
+                        <p:cond delay="indefinite"/>
+                      </p:stCondLst>
+                      <p:childTnLst>
+                        <p:par>
+                          <p:cTn id="4" fill="hold">
+                            <p:stCondLst>
+                              <p:cond delay="0"/>
+                            </p:stCondLst>
+                            <p:childTnLst>
+                              <p:par>
+                                <p:cTn id="5" presetID="1" presetClass="entr" presetSubtype="0" fill="hold" nodeType="clickEffect">
+                                  <p:stCondLst>
+                                    <p:cond delay="0"/>
+                                  </p:stCondLst>
+                                  <p:childTnLst>
+                                    <p:set>
+                                      <p:cBhvr>
+                                        <p:cTn id="6" dur="1" fill="hold">
+                                          <p:stCondLst>
+                                            <p:cond delay="0"/>
+                                          </p:stCondLst>
+                                        </p:cTn>
+                                        <p:tgtEl>
+                                          <p:spTgt spid="5"/>
+                                        </p:tgtEl>
+                                        <p:attrNameLst>
+                                          <p:attrName>style.visibility</p:attrName>
+                                        </p:attrNameLst>
+                                      </p:cBhvr>
+                                      <p:to>
+                                        <p:strVal val="visible"/>
+                                      </p:to>
+                                    </p:set>
+                                  </p:childTnLst>
+                                </p:cTn>
+                              </p:par>
+                              <p:par>
+                                <p:cTn id="7" presetID="1" presetClass="entr" presetSubtype="0" fill="hold" nodeType="withEffect">
+                                  <p:stCondLst>
+                                    <p:cond delay="0"/>
+                                  </p:stCondLst>
+                                  <p:childTnLst>
+                                    <p:set>
+                                      <p:cBhvr>
+                                        <p:cTn id="8" dur="1" fill="hold">
+                                          <p:stCondLst>
+                                            <p:cond delay="0"/>
+                                          </p:stCondLst>
+                                        </p:cTn>
+                                        <p:tgtEl>
+                                          <p:spTgt spid="6"/>
+                                        </p:tgtEl>
+                                        <p:attrNameLst>
+                                          <p:attrName>style.visibility</p:attrName>
+                                        </p:attrNameLst>
+                                      </p:cBhvr>
+                                      <p:to>
+                                        <p:strVal val="visible"/>
+                                      </p:to>
+                                    </p:set>
+                                  </p:childTnLst>
+                                </p:cTn>
+                              </p:par>
+                              <p:par>
+                                <p:cTn id="9" presetID="1" presetClass="entr" presetSubtype="0" fill="hold" nodeType="withEffect">
+                                  <p:stCondLst>
+                                    <p:cond delay="0"/>
+                                  </p:stCondLst>
+                                  <p:childTnLst>
+                                    <p:set>
+                                      <p:cBhvr>
+                                        <p:cTn id="10" dur="1" fill="hold">
+                                          <p:stCondLst>
+                                            <p:cond delay="0"/>
+                                          </p:stCondLst>
+                                        </p:cTn>
+                                        <p:tgtEl>
+                                          <p:spTgt spid="7"/>
+                                        </p:tgtEl>
+                                        <p:attrNameLst>
+                                          <p:attrName>style.visibility</p:attrName>
+                                        </p:attrNameLst>
+                                      </p:cBhvr>
+                                      <p:to>
+                                        <p:strVal val="visible"/>
+                                      </p:to>
+                                    </p:set>
+                                  </p:childTnLst>
+                                </p:cTn>
+                              </p:par>
+                              <p:par>
+                                <p:cTn id="11" presetID="1" presetClass="entr" presetSubtype="0" fill="hold" grpId="0" nodeType="withEffect">
+                                  <p:stCondLst>
+                                    <p:cond delay="0"/>
+                                  </p:stCondLst>
+                                  <p:childTnLst>
+                                    <p:set>
+                                      <p:cBhvr>
+                                        <p:cTn id="12" dur="1" fill="hold">
+                                          <p:stCondLst>
+                                            <p:cond delay="0"/>
+                                          </p:stCondLst>
+                                        </p:cTn>
+                                        <p:tgtEl>
+                                          <p:spTgt spid="18"/>
+                                        </p:tgtEl>
+                                        <p:attrNameLst>
+                                          <p:attrName>style.visibility</p:attrName>
+                                        </p:attrNameLst>
+                                      </p:cBhvr>
+                                      <p:to>
+                                        <p:strVal val="visible"/>
+                                      </p:to>
+                                    </p:set>
+                                  </p:childTnLst>
+                                </p:cTn>
+                              </p:par>
+                              <p:par>
+                                <p:cTn id="13" presetID="1" presetClass="entr" presetSubtype="0" fill="hold" grpId="0" nodeType="withEffect">
+                                  <p:stCondLst>
+                                    <p:cond delay="0"/>
+                                  </p:stCondLst>
+                                  <p:childTnLst>
+                                    <p:set>
+                                      <p:cBhvr>
+                                        <p:cTn id="14" dur="1" fill="hold">
+                                          <p:stCondLst>
+                                            <p:cond delay="0"/>
+                                          </p:stCondLst>
+                                        </p:cTn>
+                                        <p:tgtEl>
+                                          <p:spTgt spid="8"/>
+                                        </p:tgtEl>
+                                        <p:attrNameLst>
+                                          <p:attrName>style.visibility</p:attrName>
+                                        </p:attrNameLst>
+                                      </p:cBhvr>
+                                      <p:to>
+                                        <p:strVal val="visible"/>
+                                      </p:to>
+                                    </p:set>
+                                  </p:childTnLst>
+                                </p:cTn>
+                              </p:par>
+                              <p:par>
+                                <p:cTn id="15" presetID="1" presetClass="entr" presetSubtype="0" fill="hold" nodeType="withEffect">
+                                  <p:stCondLst>
+                                    <p:cond delay="0"/>
+                                  </p:stCondLst>
+                                  <p:childTnLst>
+                                    <p:set>
+                                      <p:cBhvr>
+                                        <p:cTn id="16" dur="1" fill="hold">
+                                          <p:stCondLst>
+                                            <p:cond delay="0"/>
+                                          </p:stCondLst>
+                                        </p:cTn>
+                                        <p:tgtEl>
+                                          <p:spTgt spid="16"/>
+                                        </p:tgtEl>
+                                        <p:attrNameLst>
+                                          <p:attrName>style.visibility</p:attrName>
+                                        </p:attrNameLst>
+                                      </p:cBhvr>
+                                      <p:to>
+                                        <p:strVal val="visible"/>
+                                      </p:to>
+                                    </p:set>
+                                  </p:childTnLst>
+                                </p:cTn>
+                              </p:par>
+                              <p:par>
+                                <p:cTn id="17" presetID="1" presetClass="entr" presetSubtype="0" fill="hold" nodeType="withEffect">
+                                  <p:stCondLst>
+                                    <p:cond delay="0"/>
+                                  </p:stCondLst>
+                                  <p:childTnLst>
+                                    <p:set>
+                                      <p:cBhvr>
+                                        <p:cTn id="18" dur="1" fill="hold">
+                                          <p:stCondLst>
+                                            <p:cond delay="0"/>
+                                          </p:stCondLst>
+                                        </p:cTn>
+                                        <p:tgtEl>
+                                          <p:spTgt spid="17"/>
+                                        </p:tgtEl>
+                                        <p:attrNameLst>
+                                          <p:attrName>style.visibility</p:attrName>
+                                        </p:attrNameLst>
+                                      </p:cBhvr>
+                                      <p:to>
+                                        <p:strVal val="visible"/>
+                                      </p:to>
+                                    </p:set>
+                                  </p:childTnLst>
+                                </p:cTn>
+                              </p:par>
+                              <p:par>
+                                <p:cTn id="19" presetID="1" presetClass="entr" presetSubtype="0" fill="hold" nodeType="withEffect">
+                                  <p:stCondLst>
+                                    <p:cond delay="0"/>
+                                  </p:stCondLst>
+                                  <p:childTnLst>
+                                    <p:set>
+                                      <p:cBhvr>
+                                        <p:cTn id="20" dur="1" fill="hold">
+                                          <p:stCondLst>
+                                            <p:cond delay="0"/>
+                                          </p:stCondLst>
+                                        </p:cTn>
+                                        <p:tgtEl>
+                                          <p:spTgt spid="19"/>
+                                        </p:tgtEl>
+                                        <p:attrNameLst>
+                                          <p:attrName>style.visibility</p:attrName>
+                                        </p:attrNameLst>
+                                      </p:cBhvr>
+                                      <p:to>
+                                        <p:strVal val="visible"/>
+                                      </p:to>
+                                    </p:set>
+                                  </p:childTnLst>
+                                </p:cTn>
+                              </p:par>
+                            </p:childTnLst>
+                          </p:cTn>
+                        </p:par>
+                      </p:childTnLst>
+                    </p:cTn>
+                  </p:par>
+                  <p:par>
+                    <p:cTn id="21" fill="hold">
+                      <p:stCondLst>
+                        <p:cond delay="indefinite"/>
+                      </p:stCondLst>
+                      <p:childTnLst>
+                        <p:par>
+                          <p:cTn id="22" fill="hold">
+                            <p:stCondLst>
+                              <p:cond delay="0"/>
+                            </p:stCondLst>
+                            <p:childTnLst>
+                              <p:par>
+                                <p:cTn id="23" presetID="1" presetClass="entr" presetSubtype="0" fill="hold" nodeType="clickEffect">
+                                  <p:stCondLst>
+                                    <p:cond delay="0"/>
+                                  </p:stCondLst>
+                                  <p:childTnLst>
+                                    <p:set>
+                                      <p:cBhvr>
+                                        <p:cTn id="24" dur="1" fill="hold">
+                                          <p:stCondLst>
+                                            <p:cond delay="0"/>
+                                          </p:stCondLst>
+                                        </p:cTn>
+                                        <p:tgtEl>
+                                          <p:spTgt spid="9"/>
+                                        </p:tgtEl>
+                                        <p:attrNameLst>
+                                          <p:attrName>style.visibility</p:attrName>
+                                        </p:attrNameLst>
+                                      </p:cBhvr>
+                                      <p:to>
+                                        <p:strVal val="visible"/>
+                                      </p:to>
+                                    </p:set>
+                                  </p:childTnLst>
+                                </p:cTn>
+                              </p:par>
+                              <p:par>
+                                <p:cTn id="25" presetID="1" presetClass="entr" presetSubtype="0" fill="hold" grpId="0" nodeType="withEffect">
+                                  <p:stCondLst>
+                                    <p:cond delay="0"/>
+                                  </p:stCondLst>
+                                  <p:childTnLst>
+                                    <p:set>
+                                      <p:cBhvr>
+                                        <p:cTn id="26" dur="1" fill="hold">
+                                          <p:stCondLst>
+                                            <p:cond delay="0"/>
+                                          </p:stCondLst>
+                                        </p:cTn>
+                                        <p:tgtEl>
+                                          <p:spTgt spid="10"/>
+                                        </p:tgtEl>
+                                        <p:attrNameLst>
+                                          <p:attrName>style.visibility</p:attrName>
+                                        </p:attrNameLst>
+                                      </p:cBhvr>
+                                      <p:to>
+                                        <p:strVal val="visible"/>
+                                      </p:to>
+                                    </p:set>
+                                  </p:childTnLst>
+                                </p:cTn>
+                              </p:par>
+                              <p:par>
+                                <p:cTn id="27" presetID="1" presetClass="entr" presetSubtype="0" fill="hold" grpId="0" nodeType="withEffect">
+                                  <p:stCondLst>
+                                    <p:cond delay="0"/>
+                                  </p:stCondLst>
+                                  <p:childTnLst>
+                                    <p:set>
+                                      <p:cBhvr>
+                                        <p:cTn id="28" dur="1" fill="hold">
+                                          <p:stCondLst>
+                                            <p:cond delay="0"/>
+                                          </p:stCondLst>
+                                        </p:cTn>
+                                        <p:tgtEl>
+                                          <p:spTgt spid="11"/>
+                                        </p:tgtEl>
+                                        <p:attrNameLst>
+                                          <p:attrName>style.visibility</p:attrName>
+                                        </p:attrNameLst>
+                                      </p:cBhvr>
+                                      <p:to>
+                                        <p:strVal val="visible"/>
+                                      </p:to>
+                                    </p:set>
+                                  </p:childTnLst>
+                                </p:cTn>
+                              </p:par>
+                              <p:par>
+                                <p:cTn id="29" presetID="1" presetClass="entr" presetSubtype="0" fill="hold" grpId="0" nodeType="withEffect">
+                                  <p:stCondLst>
+                                    <p:cond delay="0"/>
+                                  </p:stCondLst>
+                                  <p:childTnLst>
+                                    <p:set>
+                                      <p:cBhvr>
+                                        <p:cTn id="30" dur="1" fill="hold">
+                                          <p:stCondLst>
+                                            <p:cond delay="0"/>
+                                          </p:stCondLst>
+                                        </p:cTn>
+                                        <p:tgtEl>
+                                          <p:spTgt spid="12"/>
+                                        </p:tgtEl>
+                                        <p:attrNameLst>
+                                          <p:attrName>style.visibility</p:attrName>
+                                        </p:attrNameLst>
+                                      </p:cBhvr>
+                                      <p:to>
+                                        <p:strVal val="visible"/>
+                                      </p:to>
+                                    </p:set>
+                                  </p:childTnLst>
+                                </p:cTn>
+                              </p:par>
+                              <p:par>
+                                <p:cTn id="31" presetID="1" presetClass="entr" presetSubtype="0" fill="hold" grpId="0" nodeType="withEffect">
+                                  <p:stCondLst>
+                                    <p:cond delay="0"/>
+                                  </p:stCondLst>
+                                  <p:childTnLst>
+                                    <p:set>
+                                      <p:cBhvr>
+                                        <p:cTn id="32" dur="1" fill="hold">
+                                          <p:stCondLst>
+                                            <p:cond delay="0"/>
+                                          </p:stCondLst>
+                                        </p:cTn>
+                                        <p:tgtEl>
+                                          <p:spTgt spid="13"/>
+                                        </p:tgtEl>
+                                        <p:attrNameLst>
+                                          <p:attrName>style.visibility</p:attrName>
+                                        </p:attrNameLst>
+                                      </p:cBhvr>
+                                      <p:to>
+                                        <p:strVal val="visible"/>
+                                      </p:to>
+                                    </p:set>
+                                  </p:childTnLst>
+                                </p:cTn>
+                              </p:par>
+                              <p:par>
+                                <p:cTn id="33" presetID="1" presetClass="entr" presetSubtype="0" fill="hold" grpId="0" nodeType="withEffect">
+                                  <p:stCondLst>
+                                    <p:cond delay="0"/>
+                                  </p:stCondLst>
+                                  <p:childTnLst>
+                                    <p:set>
+                                      <p:cBhvr>
+                                        <p:cTn id="34" dur="1" fill="hold">
+                                          <p:stCondLst>
+                                            <p:cond delay="0"/>
+                                          </p:stCondLst>
+                                        </p:cTn>
+                                        <p:tgtEl>
+                                          <p:spTgt spid="14"/>
+                                        </p:tgtEl>
+                                        <p:attrNameLst>
+                                          <p:attrName>style.visibility</p:attrName>
+                                        </p:attrNameLst>
+                                      </p:cBhvr>
+                                      <p:to>
+                                        <p:strVal val="visible"/>
+                                      </p:to>
+                                    </p:set>
+                                  </p:childTnLst>
+                                </p:cTn>
+                              </p:par>
+                              <p:par>
+                                <p:cTn id="35" presetID="1" presetClass="entr" presetSubtype="0" fill="hold" grpId="0" nodeType="withEffect">
+                                  <p:stCondLst>
+                                    <p:cond delay="0"/>
+                                  </p:stCondLst>
+                                  <p:childTnLst>
+                                    <p:set>
+                                      <p:cBhvr>
+                                        <p:cTn id="36" dur="1" fill="hold">
+                                          <p:stCondLst>
+                                            <p:cond delay="0"/>
+                                          </p:stCondLst>
+                                        </p:cTn>
+                                        <p:tgtEl>
+                                          <p:spTgt spid="15"/>
+                                        </p:tgtEl>
+                                        <p:attrNameLst>
+                                          <p:attrName>style.visibility</p:attrName>
+                                        </p:attrNameLst>
+                                      </p:cBhvr>
+                                      <p:to>
+                                        <p:strVal val="visible"/>
+                                      </p:to>
+                                    </p:set>
+                                  </p:childTnLst>
+                                </p:cTn>
+                              </p:par>
+                            </p:childTnLst>
+                          </p:cTn>
+                        </p:par>
+                      </p:childTnLst>
+                    </p:cTn>
+                  </p:par>
+                </p:childTnLst>
+              </p:cTn>
+              <p:prevCondLst>
+                <p:cond evt="onPrev" delay="0">
+                  <p:tgtEl>
+                    <p:sldTgt/>
+                  </p:tgtEl>
+                </p:cond>
+              </p:prevCondLst>
+              <p:nextCondLst>
+                <p:cond evt="onNext" delay="0">
+                  <p:tgtEl>
+                    <p:sldTgt/>
+                  </p:tgtEl>
+                </p:cond>
+              </p:nextCondLst>
+            </p:seq>
+          </p:childTnLst>
+        </p:cTn>
+      </p:par>
+    </p:tnLst>
+    <p:bldLst>
+      <p:bldP spid="8" grpId="0"/>
+      <p:bldP spid="10" grpId="0"/>
+      <p:bldP spid="11" grpId="0" animBg="1"/>
+      <p:bldP spid="12" grpId="0" animBg="1"/>
+      <p:bldP spid="13" grpId="0" animBg="1"/>
+      <p:bldP spid="14" grpId="0" animBg="1"/>
+      <p:bldP spid="15" grpId="0" animBg="1"/>
+      <p:bldP spid="18" grpId="0"/>
+    </p:bldLst>
+  </p:timing>
+</p:sld>
+</file>
+
+<file path=ppt/slides/slide4.xml><?xml version="1.0" encoding="utf-8"?>
+<p:sld xmlns:a="http://schemas.openxmlformats.org/drawingml/2006/main" xmlns:r="http://schemas.openxmlformats.org/officeDocument/2006/relationships" xmlns:p="http://schemas.openxmlformats.org/presentationml/2006/main">
+  <p:cSld>
+    <p:spTree>
+      <p:nvGrpSpPr>
+        <p:cNvPr id="1" name=""/>
+        <p:cNvGrpSpPr/>
+        <p:nvPr/>
+      </p:nvGrpSpPr>
+      <p:grpSpPr>
+        <a:xfrm>
+          <a:off x="0" y="0"/>
+          <a:ext cx="0" cy="0"/>
+          <a:chOff x="0" y="0"/>
+          <a:chExt cx="0" cy="0"/>
+        </a:xfrm>
+      </p:grpSpPr>
+      <p:sp>
+        <p:nvSpPr>
+          <p:cNvPr id="3" name="Content Placeholder 2">
+            <a:extLst>
+              <a:ext uri="{FF2B5EF4-FFF2-40B4-BE49-F238E27FC236}">
+                <a16:creationId xmlns:a16="http://schemas.microsoft.com/office/drawing/2014/main" id="{B885BDF4-10A7-4283-809F-765392BFCE47}"/>
+              </a:ext>
+            </a:extLst>
+          </p:cNvPr>
+          <p:cNvSpPr>
+            <a:spLocks noGrp="1"/>
+          </p:cNvSpPr>
+          <p:nvPr>
+            <p:ph idx="1"/>
+          </p:nvPr>
+        </p:nvSpPr>
+        <p:spPr>
+          <a:xfrm>
+            <a:off x="939289" y="4143410"/>
+            <a:ext cx="10729384" cy="2256072"/>
+          </a:xfrm>
+        </p:spPr>
+        <p:txBody>
+          <a:bodyPr/>
+          <a:lstStyle/>
+          <a:p>
+            <a:r>
+              <a:rPr lang="en-US" dirty="0"/>
+              <a:t>Cannot read from database (connection error, database procedure change, … )</a:t>
+            </a:r>
+          </a:p>
+          <a:p>
+            <a:r>
+              <a:rPr lang="en-US" dirty="0"/>
+              <a:t>Encountered division by zero (application builder needs to dive in the code)</a:t>
+            </a:r>
+          </a:p>
+          <a:p>
+            <a:r>
+              <a:rPr lang="en-US" dirty="0"/>
+              <a:t>It seems to take a lot longer (need to check the math </a:t>
+            </a:r>
+            <a:r>
+              <a:rPr lang="en-US" dirty="0" err="1"/>
+              <a:t>progr</a:t>
+            </a:r>
+            <a:r>
+              <a:rPr lang="en-US" dirty="0"/>
+              <a:t> design, slow connections, …)</a:t>
+            </a:r>
+          </a:p>
+          <a:p>
+            <a:endParaRPr lang="en-US" dirty="0"/>
+          </a:p>
+          <a:p>
+            <a:r>
+              <a:rPr lang="en-US" dirty="0"/>
+              <a:t>Note: both data session and solver sessions.</a:t>
+            </a:r>
+          </a:p>
+          <a:p>
+            <a:endParaRPr lang="en-US" dirty="0"/>
+          </a:p>
+          <a:p>
+            <a:endParaRPr lang="en-US" dirty="0"/>
+          </a:p>
+        </p:txBody>
+      </p:sp>
+      <p:sp>
+        <p:nvSpPr>
+          <p:cNvPr id="2" name="Title 1">
+            <a:extLst>
+              <a:ext uri="{FF2B5EF4-FFF2-40B4-BE49-F238E27FC236}">
+                <a16:creationId xmlns:a16="http://schemas.microsoft.com/office/drawing/2014/main" id="{0197F513-F5E0-458D-AA34-8D8DD8FAE328}"/>
+              </a:ext>
+            </a:extLst>
+          </p:cNvPr>
+          <p:cNvSpPr>
+            <a:spLocks noGrp="1"/>
+          </p:cNvSpPr>
+          <p:nvPr>
+            <p:ph type="title"/>
+          </p:nvPr>
+        </p:nvSpPr>
+        <p:spPr/>
+        <p:txBody>
+          <a:bodyPr/>
+          <a:lstStyle/>
+          <a:p>
+            <a:r>
+              <a:rPr lang="en-US" dirty="0"/>
+              <a:t>Errors during end-user use</a:t>
+            </a:r>
+          </a:p>
+        </p:txBody>
+      </p:sp>
+      <p:sp>
+        <p:nvSpPr>
+          <p:cNvPr id="4" name="Slide Number Placeholder 3">
+            <a:extLst>
+              <a:ext uri="{FF2B5EF4-FFF2-40B4-BE49-F238E27FC236}">
+                <a16:creationId xmlns:a16="http://schemas.microsoft.com/office/drawing/2014/main" id="{37629900-8772-42B9-852D-C901071740CB}"/>
+              </a:ext>
+            </a:extLst>
+          </p:cNvPr>
+          <p:cNvSpPr>
+            <a:spLocks noGrp="1"/>
+          </p:cNvSpPr>
+          <p:nvPr>
+            <p:ph type="sldNum" sz="quarter" idx="4"/>
+          </p:nvPr>
+        </p:nvSpPr>
+        <p:spPr/>
+        <p:txBody>
+          <a:bodyPr/>
+          <a:lstStyle/>
+          <a:p>
+            <a:fld id="{937E74B9-F793-1749-8FE6-1D741809000E}" type="slidenum">
+              <a:rPr lang="en-US" smtClean="0"/>
+              <a:pPr/>
+              <a:t>4</a:t>
             </a:fld>
             <a:endParaRPr lang="en-US" dirty="0"/>
           </a:p>
@@ -6196,7 +7377,7 @@
 </p:sld>
 </file>
 
-<file path=ppt/slides/slide4.xml><?xml version="1.0" encoding="utf-8"?>
+<file path=ppt/slides/slide5.xml><?xml version="1.0" encoding="utf-8"?>
 <p:sld xmlns:a="http://schemas.openxmlformats.org/drawingml/2006/main" xmlns:r="http://schemas.openxmlformats.org/officeDocument/2006/relationships" xmlns:p="http://schemas.openxmlformats.org/presentationml/2006/main">
   <p:cSld>
     <p:spTree>
@@ -6301,7 +7482,7 @@
             <a:fld id="{937E74B9-F793-1749-8FE6-1D741809000E}" type="slidenum">
               <a:rPr lang="en-US" smtClean="0"/>
               <a:pPr/>
-              <a:t>4</a:t>
+              <a:t>5</a:t>
             </a:fld>
             <a:endParaRPr lang="en-US" dirty="0"/>
           </a:p>
@@ -6320,7 +7501,7 @@
 </p:sld>
 </file>
 
-<file path=ppt/slides/slide5.xml><?xml version="1.0" encoding="utf-8"?>
+<file path=ppt/slides/slide6.xml><?xml version="1.0" encoding="utf-8"?>
 <p:sld xmlns:a="http://schemas.openxmlformats.org/drawingml/2006/main" xmlns:r="http://schemas.openxmlformats.org/officeDocument/2006/relationships" xmlns:p="http://schemas.openxmlformats.org/presentationml/2006/main">
   <p:cSld>
     <p:spTree>
@@ -6572,7 +7753,7 @@
             <a:fld id="{937E74B9-F793-1749-8FE6-1D741809000E}" type="slidenum">
               <a:rPr lang="en-US" smtClean="0"/>
               <a:pPr/>
-              <a:t>5</a:t>
+              <a:t>6</a:t>
             </a:fld>
             <a:endParaRPr lang="en-US" dirty="0"/>
           </a:p>
@@ -7412,7 +8593,7 @@
 </p:sld>
 </file>
 
-<file path=ppt/slides/slide6.xml><?xml version="1.0" encoding="utf-8"?>
+<file path=ppt/slides/slide7.xml><?xml version="1.0" encoding="utf-8"?>
 <p:sld xmlns:a="http://schemas.openxmlformats.org/drawingml/2006/main" xmlns:r="http://schemas.openxmlformats.org/officeDocument/2006/relationships" xmlns:p="http://schemas.openxmlformats.org/presentationml/2006/main">
   <p:cSld>
     <p:spTree>
@@ -7527,7 +8708,7 @@
             <a:fld id="{937E74B9-F793-1749-8FE6-1D741809000E}" type="slidenum">
               <a:rPr lang="en-US" smtClean="0"/>
               <a:pPr/>
-              <a:t>6</a:t>
+              <a:t>7</a:t>
             </a:fld>
             <a:endParaRPr lang="en-US" dirty="0"/>
           </a:p>
@@ -8529,12 +9710,9 @@
 </file>
 
 <file path=customXml/item1.xml><?xml version="1.0" encoding="utf-8"?>
-<?mso-contentType ?>
-<FormTemplates xmlns="http://schemas.microsoft.com/sharepoint/v3/contenttype/forms">
-  <Display>DocumentLibraryForm</Display>
-  <Edit>DocumentLibraryForm</Edit>
-  <New>DocumentLibraryForm</New>
-</FormTemplates>
+<p:properties xmlns:p="http://schemas.microsoft.com/office/2006/metadata/properties" xmlns:xsi="http://www.w3.org/2001/XMLSchema-instance" xmlns:pc="http://schemas.microsoft.com/office/infopath/2007/PartnerControls">
+  <documentManagement/>
+</p:properties>
 </file>
 
 <file path=customXml/item2.xml><?xml version="1.0" encoding="utf-8"?>
@@ -8692,15 +9870,26 @@
 </file>
 
 <file path=customXml/item3.xml><?xml version="1.0" encoding="utf-8"?>
-<p:properties xmlns:p="http://schemas.microsoft.com/office/2006/metadata/properties" xmlns:xsi="http://www.w3.org/2001/XMLSchema-instance" xmlns:pc="http://schemas.microsoft.com/office/infopath/2007/PartnerControls">
-  <documentManagement/>
-</p:properties>
+<?mso-contentType ?>
+<FormTemplates xmlns="http://schemas.microsoft.com/sharepoint/v3/contenttype/forms">
+  <Display>DocumentLibraryForm</Display>
+  <Edit>DocumentLibraryForm</Edit>
+  <New>DocumentLibraryForm</New>
+</FormTemplates>
 </file>
 
 <file path=customXml/itemProps1.xml><?xml version="1.0" encoding="utf-8"?>
-<ds:datastoreItem xmlns:ds="http://schemas.openxmlformats.org/officeDocument/2006/customXml" ds:itemID="{74BCA57B-8451-400D-AF6D-A9DBB4806AF2}">
+<ds:datastoreItem xmlns:ds="http://schemas.openxmlformats.org/officeDocument/2006/customXml" ds:itemID="{F4BD4880-0C9A-491D-872C-CB84E58DA4AE}">
   <ds:schemaRefs>
-    <ds:schemaRef ds:uri="http://schemas.microsoft.com/sharepoint/v3/contenttype/forms"/>
+    <ds:schemaRef ds:uri="67d1ba68-3275-44c2-9ddb-2f8511f2ccbb"/>
+    <ds:schemaRef ds:uri="http://purl.org/dc/elements/1.1/"/>
+    <ds:schemaRef ds:uri="http://purl.org/dc/terms/"/>
+    <ds:schemaRef ds:uri="http://schemas.microsoft.com/office/infopath/2007/PartnerControls"/>
+    <ds:schemaRef ds:uri="http://schemas.openxmlformats.org/package/2006/metadata/core-properties"/>
+    <ds:schemaRef ds:uri="http://schemas.microsoft.com/office/2006/documentManagement/types"/>
+    <ds:schemaRef ds:uri="http://schemas.microsoft.com/office/2006/metadata/properties"/>
+    <ds:schemaRef ds:uri="http://www.w3.org/XML/1998/namespace"/>
+    <ds:schemaRef ds:uri="http://purl.org/dc/dcmitype/"/>
   </ds:schemaRefs>
 </ds:datastoreItem>
 </file>
@@ -8724,17 +9913,9 @@
 </file>
 
 <file path=customXml/itemProps3.xml><?xml version="1.0" encoding="utf-8"?>
-<ds:datastoreItem xmlns:ds="http://schemas.openxmlformats.org/officeDocument/2006/customXml" ds:itemID="{F4BD4880-0C9A-491D-872C-CB84E58DA4AE}">
+<ds:datastoreItem xmlns:ds="http://schemas.openxmlformats.org/officeDocument/2006/customXml" ds:itemID="{74BCA57B-8451-400D-AF6D-A9DBB4806AF2}">
   <ds:schemaRefs>
-    <ds:schemaRef ds:uri="67d1ba68-3275-44c2-9ddb-2f8511f2ccbb"/>
-    <ds:schemaRef ds:uri="http://purl.org/dc/elements/1.1/"/>
-    <ds:schemaRef ds:uri="http://purl.org/dc/terms/"/>
-    <ds:schemaRef ds:uri="http://schemas.microsoft.com/office/infopath/2007/PartnerControls"/>
-    <ds:schemaRef ds:uri="http://schemas.openxmlformats.org/package/2006/metadata/core-properties"/>
-    <ds:schemaRef ds:uri="http://schemas.microsoft.com/office/2006/documentManagement/types"/>
-    <ds:schemaRef ds:uri="http://schemas.microsoft.com/office/2006/metadata/properties"/>
-    <ds:schemaRef ds:uri="http://www.w3.org/XML/1998/namespace"/>
-    <ds:schemaRef ds:uri="http://purl.org/dc/dcmitype/"/>
+    <ds:schemaRef ds:uri="http://schemas.microsoft.com/sharepoint/v3/contenttype/forms"/>
   </ds:schemaRefs>
 </ds:datastoreItem>
 </file>
</xml_diff>